<commit_message>
add link from index page to slides
</commit_message>
<xml_diff>
--- a/events/2022-03-16/slides/00-index.pptx
+++ b/events/2022-03-16/slides/00-index.pptx
@@ -5,12 +5,13 @@
     <p:sldMasterId id="2147483660" r:id="rId1"/>
   </p:sldMasterIdLst>
   <p:notesMasterIdLst>
-    <p:notesMasterId r:id="rId5"/>
+    <p:notesMasterId r:id="rId6"/>
   </p:notesMasterIdLst>
   <p:sldIdLst>
     <p:sldId id="256" r:id="rId2"/>
-    <p:sldId id="365" r:id="rId3"/>
-    <p:sldId id="366" r:id="rId4"/>
+    <p:sldId id="367" r:id="rId3"/>
+    <p:sldId id="365" r:id="rId4"/>
+    <p:sldId id="366" r:id="rId5"/>
   </p:sldIdLst>
   <p:sldSz cx="9144000" cy="6858000" type="screen4x3"/>
   <p:notesSz cx="6858000" cy="9144000"/>
@@ -225,7 +226,7 @@
             <a:fld id="{35305EB0-020F-4995-961E-A35B2BB78D2B}" type="datetimeFigureOut">
               <a:rPr kumimoji="1" lang="ja-JP" altLang="en-US" smtClean="0"/>
               <a:pPr/>
-              <a:t>2022/3/13</a:t>
+              <a:t>2022/3/15</a:t>
             </a:fld>
             <a:endParaRPr kumimoji="1" lang="ja-JP" altLang="en-US"/>
           </a:p>
@@ -588,7 +589,7 @@
             <a:fld id="{FD842DED-4B9B-4568-AC85-B50FA0785511}" type="slidenum">
               <a:rPr kumimoji="1" lang="ja-JP" altLang="en-US" smtClean="0"/>
               <a:pPr/>
-              <a:t>2</a:t>
+              <a:t>3</a:t>
             </a:fld>
             <a:endParaRPr kumimoji="1" lang="ja-JP" altLang="en-US"/>
           </a:p>
@@ -52672,6 +52673,380 @@
       </p:grpSpPr>
       <p:sp>
         <p:nvSpPr>
+          <p:cNvPr id="2" name="タイトル 1">
+            <a:extLst>
+              <a:ext uri="{FF2B5EF4-FFF2-40B4-BE49-F238E27FC236}">
+                <a16:creationId xmlns:a16="http://schemas.microsoft.com/office/drawing/2014/main" id="{B8D0E0AF-84BE-43D0-B25C-044C0D35E3B7}"/>
+              </a:ext>
+            </a:extLst>
+          </p:cNvPr>
+          <p:cNvSpPr>
+            <a:spLocks noGrp="1"/>
+          </p:cNvSpPr>
+          <p:nvPr>
+            <p:ph type="title"/>
+          </p:nvPr>
+        </p:nvSpPr>
+        <p:spPr/>
+        <p:txBody>
+          <a:bodyPr/>
+          <a:lstStyle/>
+          <a:p>
+            <a:r>
+              <a:rPr kumimoji="1" lang="ja-JP" altLang="en-US" dirty="0"/>
+              <a:t>開催趣旨</a:t>
+            </a:r>
+          </a:p>
+        </p:txBody>
+      </p:sp>
+      <p:sp>
+        <p:nvSpPr>
+          <p:cNvPr id="3" name="コンテンツ プレースホルダー 2">
+            <a:extLst>
+              <a:ext uri="{FF2B5EF4-FFF2-40B4-BE49-F238E27FC236}">
+                <a16:creationId xmlns:a16="http://schemas.microsoft.com/office/drawing/2014/main" id="{F1E1F0C6-BA5F-455E-A37F-7246779F046B}"/>
+              </a:ext>
+            </a:extLst>
+          </p:cNvPr>
+          <p:cNvSpPr>
+            <a:spLocks noGrp="1"/>
+          </p:cNvSpPr>
+          <p:nvPr>
+            <p:ph idx="1"/>
+          </p:nvPr>
+        </p:nvSpPr>
+        <p:spPr>
+          <a:xfrm>
+            <a:off x="457200" y="1500174"/>
+            <a:ext cx="8435280" cy="4525963"/>
+          </a:xfrm>
+        </p:spPr>
+        <p:txBody>
+          <a:bodyPr>
+            <a:normAutofit/>
+          </a:bodyPr>
+          <a:lstStyle/>
+          <a:p>
+            <a:r>
+              <a:rPr kumimoji="1" lang="ja-JP" altLang="en-US" dirty="0"/>
+              <a:t>本学の授業が初めてでもわかるよう、大学で提供する</a:t>
+            </a:r>
+            <a:r>
+              <a:rPr kumimoji="1" lang="en-US" altLang="ja-JP" dirty="0"/>
+              <a:t>ICT</a:t>
+            </a:r>
+            <a:r>
+              <a:rPr kumimoji="1" lang="ja-JP" altLang="en-US" dirty="0"/>
+              <a:t>サービスを説明</a:t>
+            </a:r>
+            <a:endParaRPr kumimoji="1" lang="en-US" altLang="ja-JP" dirty="0"/>
+          </a:p>
+          <a:p>
+            <a:r>
+              <a:rPr lang="en-US" altLang="ja-JP" dirty="0"/>
+              <a:t>ICT</a:t>
+            </a:r>
+            <a:r>
+              <a:rPr lang="ja-JP" altLang="en-US" dirty="0"/>
+              <a:t>活用が有用・必要な場面はオンライン授業だけではない</a:t>
+            </a:r>
+            <a:endParaRPr lang="en-US" altLang="ja-JP" dirty="0"/>
+          </a:p>
+          <a:p>
+            <a:pPr lvl="1"/>
+            <a:r>
+              <a:rPr lang="ja-JP" altLang="en-US" dirty="0">
+                <a:solidFill>
+                  <a:srgbClr val="C00000"/>
+                </a:solidFill>
+              </a:rPr>
+              <a:t>コロナの始まりで必須になったがコロナの終わりで不要になるのではない</a:t>
+            </a:r>
+            <a:endParaRPr lang="en-US" altLang="ja-JP" dirty="0">
+              <a:solidFill>
+                <a:srgbClr val="C00000"/>
+              </a:solidFill>
+            </a:endParaRPr>
+          </a:p>
+        </p:txBody>
+      </p:sp>
+      <p:sp>
+        <p:nvSpPr>
+          <p:cNvPr id="4" name="日付プレースホルダー 3">
+            <a:extLst>
+              <a:ext uri="{FF2B5EF4-FFF2-40B4-BE49-F238E27FC236}">
+                <a16:creationId xmlns:a16="http://schemas.microsoft.com/office/drawing/2014/main" id="{0B5622BB-C73A-40FB-A06B-E8BEBE78C965}"/>
+              </a:ext>
+            </a:extLst>
+          </p:cNvPr>
+          <p:cNvSpPr>
+            <a:spLocks noGrp="1"/>
+          </p:cNvSpPr>
+          <p:nvPr>
+            <p:ph type="dt" sz="half" idx="10"/>
+          </p:nvPr>
+        </p:nvSpPr>
+        <p:spPr/>
+        <p:txBody>
+          <a:bodyPr/>
+          <a:lstStyle/>
+          <a:p>
+            <a:r>
+              <a:rPr kumimoji="1" lang="en-US" altLang="ja-JP"/>
+              <a:t>2022/3/16</a:t>
+            </a:r>
+            <a:endParaRPr kumimoji="1" lang="ja-JP" altLang="en-US"/>
+          </a:p>
+        </p:txBody>
+      </p:sp>
+      <p:sp>
+        <p:nvSpPr>
+          <p:cNvPr id="5" name="フッター プレースホルダー 4">
+            <a:extLst>
+              <a:ext uri="{FF2B5EF4-FFF2-40B4-BE49-F238E27FC236}">
+                <a16:creationId xmlns:a16="http://schemas.microsoft.com/office/drawing/2014/main" id="{D3C24AD8-D79D-4DD2-84F5-E248B2D20DCD}"/>
+              </a:ext>
+            </a:extLst>
+          </p:cNvPr>
+          <p:cNvSpPr>
+            <a:spLocks noGrp="1"/>
+          </p:cNvSpPr>
+          <p:nvPr>
+            <p:ph type="ftr" sz="quarter" idx="11"/>
+          </p:nvPr>
+        </p:nvSpPr>
+        <p:spPr/>
+        <p:txBody>
+          <a:bodyPr/>
+          <a:lstStyle/>
+          <a:p>
+            <a:r>
+              <a:rPr kumimoji="1" lang="en-US" altLang="ja-JP"/>
+              <a:t>2022 S</a:t>
+            </a:r>
+            <a:r>
+              <a:rPr kumimoji="1" lang="ja-JP" altLang="en-US"/>
+              <a:t>セメスタ 説明会 </a:t>
+            </a:r>
+            <a:r>
+              <a:rPr kumimoji="1" lang="en-US" altLang="ja-JP"/>
+              <a:t>https://utelecon.adm.u-tokyo.ac.jp/</a:t>
+            </a:r>
+            <a:endParaRPr kumimoji="1" lang="ja-JP" altLang="en-US"/>
+          </a:p>
+        </p:txBody>
+      </p:sp>
+      <p:sp>
+        <p:nvSpPr>
+          <p:cNvPr id="6" name="スライド番号プレースホルダー 5">
+            <a:extLst>
+              <a:ext uri="{FF2B5EF4-FFF2-40B4-BE49-F238E27FC236}">
+                <a16:creationId xmlns:a16="http://schemas.microsoft.com/office/drawing/2014/main" id="{D144B316-B2EC-4CE9-834B-7D10742502BA}"/>
+              </a:ext>
+            </a:extLst>
+          </p:cNvPr>
+          <p:cNvSpPr>
+            <a:spLocks noGrp="1"/>
+          </p:cNvSpPr>
+          <p:nvPr>
+            <p:ph type="sldNum" sz="quarter" idx="12"/>
+          </p:nvPr>
+        </p:nvSpPr>
+        <p:spPr/>
+        <p:txBody>
+          <a:bodyPr/>
+          <a:lstStyle/>
+          <a:p>
+            <a:fld id="{EDF77D8D-9987-453A-9A05-EB91CA595C68}" type="slidenum">
+              <a:rPr kumimoji="1" lang="ja-JP" altLang="en-US" smtClean="0"/>
+              <a:pPr/>
+              <a:t>2</a:t>
+            </a:fld>
+            <a:endParaRPr kumimoji="1" lang="ja-JP" altLang="en-US"/>
+          </a:p>
+        </p:txBody>
+      </p:sp>
+      <p:sp>
+        <p:nvSpPr>
+          <p:cNvPr id="7" name="正方形/長方形 6">
+            <a:extLst>
+              <a:ext uri="{FF2B5EF4-FFF2-40B4-BE49-F238E27FC236}">
+                <a16:creationId xmlns:a16="http://schemas.microsoft.com/office/drawing/2014/main" id="{9336D7AE-5974-4AE9-8531-79ADCA2197FB}"/>
+              </a:ext>
+            </a:extLst>
+          </p:cNvPr>
+          <p:cNvSpPr/>
+          <p:nvPr/>
+        </p:nvSpPr>
+        <p:spPr>
+          <a:xfrm>
+            <a:off x="683568" y="4827723"/>
+            <a:ext cx="7200800" cy="1060206"/>
+          </a:xfrm>
+          <a:prstGeom prst="rect">
+            <a:avLst/>
+          </a:prstGeom>
+        </p:spPr>
+        <p:style>
+          <a:lnRef idx="2">
+            <a:schemeClr val="accent1">
+              <a:shade val="50000"/>
+            </a:schemeClr>
+          </a:lnRef>
+          <a:fillRef idx="1">
+            <a:schemeClr val="accent1"/>
+          </a:fillRef>
+          <a:effectRef idx="0">
+            <a:schemeClr val="accent1"/>
+          </a:effectRef>
+          <a:fontRef idx="minor">
+            <a:schemeClr val="lt1"/>
+          </a:fontRef>
+        </p:style>
+        <p:txBody>
+          <a:bodyPr rtlCol="0" anchor="ctr"/>
+          <a:lstStyle/>
+          <a:p>
+            <a:pPr marL="285750" indent="-285750">
+              <a:buFont typeface="Arial" panose="020B0604020202020204" pitchFamily="34" charset="0"/>
+              <a:buChar char="•"/>
+            </a:pPr>
+            <a:r>
+              <a:rPr lang="ja-JP" altLang="en-US" dirty="0">
+                <a:solidFill>
+                  <a:schemeClr val="tx1"/>
+                </a:solidFill>
+              </a:rPr>
+              <a:t>今後も</a:t>
+            </a:r>
+            <a:r>
+              <a:rPr kumimoji="1" lang="ja-JP" altLang="en-US" dirty="0">
+                <a:solidFill>
+                  <a:schemeClr val="tx1"/>
+                </a:solidFill>
+              </a:rPr>
+              <a:t>わかりやすい情報発信・質の高いサポートを目指します</a:t>
+            </a:r>
+            <a:endParaRPr lang="en-US" altLang="ja-JP" dirty="0">
+              <a:solidFill>
+                <a:schemeClr val="tx1"/>
+              </a:solidFill>
+            </a:endParaRPr>
+          </a:p>
+          <a:p>
+            <a:pPr marL="742950" lvl="1" indent="-285750">
+              <a:buFont typeface="Arial" panose="020B0604020202020204" pitchFamily="34" charset="0"/>
+              <a:buChar char="•"/>
+            </a:pPr>
+            <a:r>
+              <a:rPr lang="ja-JP" altLang="en-US" dirty="0">
+                <a:solidFill>
+                  <a:srgbClr val="00B050"/>
+                </a:solidFill>
+              </a:rPr>
+              <a:t>学生が日々活躍</a:t>
+            </a:r>
+            <a:r>
+              <a:rPr lang="ja-JP" altLang="en-US" dirty="0">
+                <a:solidFill>
+                  <a:schemeClr val="tx1"/>
+                </a:solidFill>
+              </a:rPr>
+              <a:t>しています</a:t>
+            </a:r>
+            <a:endParaRPr lang="en-US" altLang="ja-JP" dirty="0">
+              <a:solidFill>
+                <a:schemeClr val="tx1"/>
+              </a:solidFill>
+            </a:endParaRPr>
+          </a:p>
+          <a:p>
+            <a:pPr marL="742950" lvl="1" indent="-285750">
+              <a:buFont typeface="Arial" panose="020B0604020202020204" pitchFamily="34" charset="0"/>
+              <a:buChar char="•"/>
+            </a:pPr>
+            <a:r>
+              <a:rPr lang="en-US" altLang="ja-JP" dirty="0" err="1">
+                <a:solidFill>
+                  <a:schemeClr val="tx1"/>
+                </a:solidFill>
+              </a:rPr>
+              <a:t>utelecon</a:t>
+            </a:r>
+            <a:r>
+              <a:rPr lang="ja-JP" altLang="en-US" dirty="0">
+                <a:solidFill>
+                  <a:schemeClr val="tx1"/>
+                </a:solidFill>
+                <a:hlinkClick r:id="rId2"/>
+              </a:rPr>
+              <a:t>紹介</a:t>
+            </a:r>
+            <a:r>
+              <a:rPr lang="ja-JP" altLang="en-US" dirty="0">
+                <a:solidFill>
+                  <a:schemeClr val="tx1"/>
+                </a:solidFill>
+              </a:rPr>
+              <a:t>と</a:t>
+            </a:r>
+            <a:r>
+              <a:rPr lang="ja-JP" altLang="en-US" dirty="0">
+                <a:solidFill>
+                  <a:schemeClr val="tx1"/>
+                </a:solidFill>
+                <a:hlinkClick r:id="rId3"/>
+              </a:rPr>
+              <a:t>活動理念・目的</a:t>
+            </a:r>
+            <a:r>
+              <a:rPr lang="ja-JP" altLang="en-US" dirty="0">
+                <a:solidFill>
+                  <a:schemeClr val="tx1"/>
+                </a:solidFill>
+              </a:rPr>
+              <a:t>もご覧ください</a:t>
+            </a:r>
+            <a:endParaRPr kumimoji="1" lang="ja-JP" altLang="en-US" dirty="0">
+              <a:solidFill>
+                <a:schemeClr val="tx1"/>
+              </a:solidFill>
+            </a:endParaRPr>
+          </a:p>
+        </p:txBody>
+      </p:sp>
+    </p:spTree>
+    <p:extLst>
+      <p:ext uri="{BB962C8B-B14F-4D97-AF65-F5344CB8AC3E}">
+        <p14:creationId xmlns:p14="http://schemas.microsoft.com/office/powerpoint/2010/main" val="3671589039"/>
+      </p:ext>
+    </p:extLst>
+  </p:cSld>
+  <p:clrMapOvr>
+    <a:masterClrMapping/>
+  </p:clrMapOvr>
+</p:sld>
+</file>
+
+<file path=ppt/slides/slide3.xml><?xml version="1.0" encoding="utf-8"?>
+<p:sld xmlns:a="http://schemas.openxmlformats.org/drawingml/2006/main" xmlns:r="http://schemas.openxmlformats.org/officeDocument/2006/relationships" xmlns:p="http://schemas.openxmlformats.org/presentationml/2006/main">
+  <p:cSld>
+    <p:spTree>
+      <p:nvGrpSpPr>
+        <p:cNvPr id="1" name=""/>
+        <p:cNvGrpSpPr/>
+        <p:nvPr/>
+      </p:nvGrpSpPr>
+      <p:grpSpPr>
+        <a:xfrm>
+          <a:off x="0" y="0"/>
+          <a:ext cx="0" cy="0"/>
+          <a:chOff x="0" y="0"/>
+          <a:chExt cx="0" cy="0"/>
+        </a:xfrm>
+      </p:grpSpPr>
+      <p:sp>
+        <p:nvSpPr>
           <p:cNvPr id="2" name="タイトル 1"/>
           <p:cNvSpPr>
             <a:spLocks noGrp="1"/>
@@ -52738,7 +53113,15 @@
             </a:r>
             <a:r>
               <a:rPr lang="ja-JP" altLang="en-US" sz="2000" dirty="0"/>
-              <a:t>田浦 〇分</a:t>
+              <a:t>田浦 </a:t>
+            </a:r>
+            <a:r>
+              <a:rPr lang="en-US" altLang="ja-JP" sz="2000" dirty="0"/>
+              <a:t>10</a:t>
+            </a:r>
+            <a:r>
+              <a:rPr lang="ja-JP" altLang="en-US" sz="2000" dirty="0"/>
+              <a:t>分</a:t>
             </a:r>
             <a:r>
               <a:rPr lang="en-US" altLang="ja-JP" sz="2000" dirty="0"/>
@@ -52760,7 +53143,15 @@
             </a:r>
             <a:r>
               <a:rPr lang="ja-JP" altLang="en-US" sz="2000" dirty="0"/>
-              <a:t>柴山 〇分</a:t>
+              <a:t>柴山 </a:t>
+            </a:r>
+            <a:r>
+              <a:rPr lang="en-US" altLang="ja-JP" sz="2000" dirty="0"/>
+              <a:t>30</a:t>
+            </a:r>
+            <a:r>
+              <a:rPr lang="ja-JP" altLang="en-US" sz="2000" dirty="0"/>
+              <a:t>分</a:t>
             </a:r>
             <a:r>
               <a:rPr lang="en-US" altLang="ja-JP" sz="2000" dirty="0"/>
@@ -52782,7 +53173,15 @@
             </a:r>
             <a:r>
               <a:rPr lang="ja-JP" altLang="en-US" sz="2000" dirty="0"/>
-              <a:t>田浦 〇分</a:t>
+              <a:t>田浦 </a:t>
+            </a:r>
+            <a:r>
+              <a:rPr lang="en-US" altLang="ja-JP" sz="2000" dirty="0"/>
+              <a:t>15</a:t>
+            </a:r>
+            <a:r>
+              <a:rPr lang="ja-JP" altLang="en-US" sz="2000" dirty="0"/>
+              <a:t>分</a:t>
             </a:r>
             <a:r>
               <a:rPr lang="en-US" altLang="ja-JP" sz="2000" dirty="0"/>
@@ -52804,7 +53203,15 @@
             </a:r>
             <a:r>
               <a:rPr lang="ja-JP" altLang="en-US" sz="2000" dirty="0"/>
-              <a:t>玉造 〇分</a:t>
+              <a:t>玉造 </a:t>
+            </a:r>
+            <a:r>
+              <a:rPr lang="en-US" altLang="ja-JP" sz="2000" dirty="0"/>
+              <a:t>15</a:t>
+            </a:r>
+            <a:r>
+              <a:rPr lang="ja-JP" altLang="en-US" sz="2000" dirty="0"/>
+              <a:t>分</a:t>
             </a:r>
             <a:r>
               <a:rPr lang="en-US" altLang="ja-JP" sz="2000" dirty="0"/>
@@ -52818,27 +53225,11 @@
             </a:r>
             <a:r>
               <a:rPr lang="en-US" altLang="ja-JP" dirty="0" err="1"/>
-              <a:t>u</a:t>
-            </a:r>
-            <a:r>
-              <a:rPr lang="en-US" altLang="ja-JP" dirty="0" err="1">
-                <a:highlight>
-                  <a:srgbClr val="FFFF00"/>
-                </a:highlight>
-              </a:rPr>
-              <a:t>telecon</a:t>
-            </a:r>
-            <a:r>
-              <a:rPr lang="ja-JP" altLang="en-US" dirty="0">
-                <a:highlight>
-                  <a:srgbClr val="FFFF00"/>
-                </a:highlight>
-              </a:rPr>
-              <a:t>とサポータについ</a:t>
+              <a:t>utelecon</a:t>
             </a:r>
             <a:r>
               <a:rPr lang="ja-JP" altLang="en-US" dirty="0"/>
-              <a:t>て </a:t>
+              <a:t>とサポータについて </a:t>
             </a:r>
             <a:r>
               <a:rPr lang="en-US" altLang="ja-JP" sz="2000" dirty="0"/>
@@ -52846,7 +53237,15 @@
             </a:r>
             <a:r>
               <a:rPr lang="ja-JP" altLang="en-US" sz="2000" dirty="0"/>
-              <a:t>鈴木 〇分</a:t>
+              <a:t>鈴木 </a:t>
+            </a:r>
+            <a:r>
+              <a:rPr lang="en-US" altLang="ja-JP" sz="2000" dirty="0"/>
+              <a:t>20</a:t>
+            </a:r>
+            <a:r>
+              <a:rPr lang="ja-JP" altLang="en-US" sz="2000" dirty="0"/>
+              <a:t>分</a:t>
             </a:r>
             <a:r>
               <a:rPr lang="en-US" altLang="ja-JP" sz="2000" dirty="0"/>
@@ -52928,9 +53327,81 @@
             <a:fld id="{EDF77D8D-9987-453A-9A05-EB91CA595C68}" type="slidenum">
               <a:rPr kumimoji="1" lang="ja-JP" altLang="en-US" smtClean="0"/>
               <a:pPr/>
-              <a:t>2</a:t>
+              <a:t>3</a:t>
             </a:fld>
             <a:endParaRPr kumimoji="1" lang="ja-JP" altLang="en-US"/>
+          </a:p>
+        </p:txBody>
+      </p:sp>
+      <p:sp>
+        <p:nvSpPr>
+          <p:cNvPr id="7" name="正方形/長方形 6">
+            <a:extLst>
+              <a:ext uri="{FF2B5EF4-FFF2-40B4-BE49-F238E27FC236}">
+                <a16:creationId xmlns:a16="http://schemas.microsoft.com/office/drawing/2014/main" id="{B78DE8CA-8D48-43B7-A5A8-9D6034BB7886}"/>
+              </a:ext>
+            </a:extLst>
+          </p:cNvPr>
+          <p:cNvSpPr/>
+          <p:nvPr/>
+        </p:nvSpPr>
+        <p:spPr>
+          <a:xfrm>
+            <a:off x="1403648" y="5085184"/>
+            <a:ext cx="6120680" cy="792088"/>
+          </a:xfrm>
+          <a:prstGeom prst="rect">
+            <a:avLst/>
+          </a:prstGeom>
+        </p:spPr>
+        <p:style>
+          <a:lnRef idx="2">
+            <a:schemeClr val="accent1">
+              <a:shade val="50000"/>
+            </a:schemeClr>
+          </a:lnRef>
+          <a:fillRef idx="1">
+            <a:schemeClr val="accent1"/>
+          </a:fillRef>
+          <a:effectRef idx="0">
+            <a:schemeClr val="accent1"/>
+          </a:effectRef>
+          <a:fontRef idx="minor">
+            <a:schemeClr val="lt1"/>
+          </a:fontRef>
+        </p:style>
+        <p:txBody>
+          <a:bodyPr rtlCol="0" anchor="ctr"/>
+          <a:lstStyle/>
+          <a:p>
+            <a:r>
+              <a:rPr kumimoji="1" lang="ja-JP" altLang="en-US" dirty="0">
+                <a:solidFill>
+                  <a:schemeClr val="tx1"/>
+                </a:solidFill>
+              </a:rPr>
+              <a:t>時間は目安です</a:t>
+            </a:r>
+            <a:endParaRPr kumimoji="1" lang="en-US" altLang="ja-JP" dirty="0">
+              <a:solidFill>
+                <a:schemeClr val="tx1"/>
+              </a:solidFill>
+            </a:endParaRPr>
+          </a:p>
+          <a:p>
+            <a:r>
+              <a:rPr lang="ja-JP" altLang="en-US" dirty="0">
+                <a:solidFill>
+                  <a:schemeClr val="tx1"/>
+                </a:solidFill>
+              </a:rPr>
+              <a:t>質問は時間後も無くなるまで受け付けます</a:t>
+            </a:r>
+            <a:endParaRPr kumimoji="1" lang="ja-JP" altLang="en-US" dirty="0">
+              <a:solidFill>
+                <a:schemeClr val="tx1"/>
+              </a:solidFill>
+            </a:endParaRPr>
           </a:p>
         </p:txBody>
       </p:sp>
@@ -52942,7 +53413,7 @@
 </p:sld>
 </file>
 
-<file path=ppt/slides/slide3.xml><?xml version="1.0" encoding="utf-8"?>
+<file path=ppt/slides/slide4.xml><?xml version="1.0" encoding="utf-8"?>
 <p:sld xmlns:a="http://schemas.openxmlformats.org/drawingml/2006/main" xmlns:r="http://schemas.openxmlformats.org/officeDocument/2006/relationships" xmlns:p="http://schemas.openxmlformats.org/presentationml/2006/main">
   <p:cSld>
     <p:spTree>
@@ -52982,7 +53453,7 @@
           <a:p>
             <a:r>
               <a:rPr kumimoji="1" lang="ja-JP" altLang="en-US" dirty="0"/>
-              <a:t>質問とご意見</a:t>
+              <a:t>質問と意見交換</a:t>
             </a:r>
           </a:p>
         </p:txBody>
@@ -53005,8 +53476,8 @@
         </p:nvSpPr>
         <p:spPr>
           <a:xfrm>
-            <a:off x="457200" y="1500175"/>
-            <a:ext cx="8686800" cy="3867956"/>
+            <a:off x="107504" y="1500174"/>
+            <a:ext cx="9036496" cy="4089065"/>
           </a:xfrm>
         </p:spPr>
         <p:txBody>
@@ -53038,15 +53509,18 @@
             <a:endParaRPr kumimoji="1" lang="en-US" altLang="ja-JP" dirty="0"/>
           </a:p>
           <a:p>
-            <a:pPr lvl="1"/>
+            <a:r>
+              <a:rPr lang="en-US" altLang="ja-JP" dirty="0"/>
+              <a:t>1. </a:t>
+            </a:r>
             <a:r>
               <a:rPr lang="ja-JP" altLang="en-US" dirty="0"/>
-              <a:t>質問用</a:t>
+              <a:t>質問</a:t>
             </a:r>
             <a:endParaRPr lang="en-US" altLang="ja-JP" dirty="0"/>
           </a:p>
           <a:p>
-            <a:pPr lvl="2"/>
+            <a:pPr lvl="1"/>
             <a:r>
               <a:rPr lang="ja-JP" altLang="en-US" dirty="0"/>
               <a:t>説明内容やそれに関連する質問</a:t>
@@ -53056,13 +53530,24 @@
           <a:p>
             <a:pPr lvl="1"/>
             <a:r>
+              <a:rPr lang="ja-JP" altLang="en-US" dirty="0"/>
+              <a:t>説明中任意のタイミングでご質問ください</a:t>
+            </a:r>
+            <a:endParaRPr lang="en-US" altLang="ja-JP" dirty="0"/>
+          </a:p>
+          <a:p>
+            <a:r>
+              <a:rPr kumimoji="1" lang="en-US" altLang="ja-JP" dirty="0"/>
+              <a:t>2. </a:t>
+            </a:r>
+            <a:r>
               <a:rPr kumimoji="1" lang="ja-JP" altLang="en-US" dirty="0"/>
-              <a:t>ご意見・要望・コメント用</a:t>
+              <a:t>意見交換</a:t>
             </a:r>
             <a:endParaRPr kumimoji="1" lang="en-US" altLang="ja-JP" dirty="0"/>
           </a:p>
           <a:p>
-            <a:pPr lvl="2"/>
+            <a:pPr lvl="1"/>
             <a:r>
               <a:rPr lang="en-US" altLang="ja-JP" dirty="0" err="1"/>
               <a:t>utelecon</a:t>
@@ -53086,42 +53571,16 @@
             <a:endParaRPr kumimoji="1" lang="en-US" altLang="ja-JP" dirty="0"/>
           </a:p>
           <a:p>
-            <a:pPr lvl="2"/>
+            <a:pPr lvl="1"/>
+            <a:r>
+              <a:rPr lang="ja-JP" altLang="en-US"/>
+              <a:t>説明パート終了後</a:t>
+            </a:r>
             <a:r>
               <a:rPr lang="ja-JP" altLang="en-US" dirty="0"/>
-              <a:t>説明会後に少し意見交換の時間を取ります</a:t>
+              <a:t>に行います。お時間ありましたらぜひご参加ください</a:t>
             </a:r>
             <a:endParaRPr lang="en-US" altLang="ja-JP" dirty="0"/>
-          </a:p>
-          <a:p>
-            <a:r>
-              <a:rPr kumimoji="1" lang="en-US" altLang="ja-JP" dirty="0" err="1"/>
-              <a:t>LearnWiz</a:t>
-            </a:r>
-            <a:r>
-              <a:rPr kumimoji="1" lang="en-US" altLang="ja-JP" dirty="0"/>
-              <a:t> One</a:t>
-            </a:r>
-            <a:r>
-              <a:rPr kumimoji="1" lang="ja-JP" altLang="en-US" dirty="0"/>
-              <a:t>の</a:t>
-            </a:r>
-            <a:r>
-              <a:rPr kumimoji="1" lang="ja-JP" altLang="en-US" dirty="0">
-                <a:highlight>
-                  <a:srgbClr val="FFFF00"/>
-                </a:highlight>
-              </a:rPr>
-              <a:t>「いいね」機能やランダムにほかの人の意見が見える点についての説明</a:t>
-            </a:r>
-            <a:r>
-              <a:rPr kumimoji="1" lang="ja-JP" altLang="en-US" dirty="0"/>
-              <a:t>は</a:t>
-            </a:r>
-            <a:r>
-              <a:rPr kumimoji="1" lang="en-US" altLang="ja-JP" dirty="0"/>
-              <a:t>?</a:t>
-            </a:r>
           </a:p>
         </p:txBody>
       </p:sp>
@@ -53215,7 +53674,7 @@
             <a:fld id="{EDF77D8D-9987-453A-9A05-EB91CA595C68}" type="slidenum">
               <a:rPr kumimoji="1" lang="ja-JP" altLang="en-US" smtClean="0"/>
               <a:pPr/>
-              <a:t>3</a:t>
+              <a:t>4</a:t>
             </a:fld>
             <a:endParaRPr kumimoji="1" lang="ja-JP" altLang="en-US"/>
           </a:p>
@@ -53235,7 +53694,7 @@
         </p:nvSpPr>
         <p:spPr>
           <a:xfrm>
-            <a:off x="2123728" y="5733256"/>
+            <a:off x="2123728" y="5582095"/>
             <a:ext cx="6408712" cy="623094"/>
           </a:xfrm>
           <a:prstGeom prst="rect">

</xml_diff>

<commit_message>
changed time allocation in 00-index
</commit_message>
<xml_diff>
--- a/events/2022-03-16/slides/00-index.pptx
+++ b/events/2022-03-16/slides/00-index.pptx
@@ -53177,7 +53177,7 @@
             </a:r>
             <a:r>
               <a:rPr lang="en-US" altLang="ja-JP" sz="2000" dirty="0"/>
-              <a:t>15</a:t>
+              <a:t>20</a:t>
             </a:r>
             <a:r>
               <a:rPr lang="ja-JP" altLang="en-US" sz="2000" dirty="0"/>
@@ -53207,7 +53207,7 @@
             </a:r>
             <a:r>
               <a:rPr lang="en-US" altLang="ja-JP" sz="2000" dirty="0"/>
-              <a:t>15</a:t>
+              <a:t>20</a:t>
             </a:r>
             <a:r>
               <a:rPr lang="ja-JP" altLang="en-US" sz="2000" dirty="0"/>
@@ -53240,8 +53240,8 @@
               <a:t>鈴木 </a:t>
             </a:r>
             <a:r>
-              <a:rPr lang="en-US" altLang="ja-JP" sz="2000" dirty="0"/>
-              <a:t>20</a:t>
+              <a:rPr lang="en-US" altLang="ja-JP" sz="2000"/>
+              <a:t>10</a:t>
             </a:r>
             <a:r>
               <a:rPr lang="ja-JP" altLang="en-US" sz="2000" dirty="0"/>

</xml_diff>